<commit_message>
corrected formatting and some better res images
</commit_message>
<xml_diff>
--- a/Curriculum/Week_1/Lectures/1.2_Git_and_SVN_optional.pptx
+++ b/Curriculum/Week_1/Lectures/1.2_Git_and_SVN_optional.pptx
@@ -7956,7 +7956,15 @@
             </a:pPr>
             <a:r>
               <a:rPr lang="en" dirty="0"/>
-              <a:t>Check out/pull - getting a copy of the master code for the first time, or updating your local with any changes checked in to the master since the last time you pulled</a:t>
+              <a:t>Check out/pull - getting a copy of the master code for the first time, or updating your local with any changes </a:t>
+            </a:r>
+            <a:r>
+              <a:rPr lang="en" dirty="0" smtClean="0"/>
+              <a:t>to master </a:t>
+            </a:r>
+            <a:r>
+              <a:rPr lang="en" dirty="0"/>
+              <a:t>since the last time you pulled</a:t>
             </a:r>
           </a:p>
           <a:p>
@@ -7976,7 +7984,31 @@
             </a:pPr>
             <a:r>
               <a:rPr lang="en" dirty="0"/>
-              <a:t>Commit - a group of similar changes (feature or bug fix) that you bundle into single push to master</a:t>
+              <a:t>Commit - a group of similar changes </a:t>
+            </a:r>
+            <a:r>
+              <a:rPr lang="en" dirty="0" smtClean="0"/>
+              <a:t>that </a:t>
+            </a:r>
+            <a:r>
+              <a:rPr lang="en" dirty="0"/>
+              <a:t>you bundle </a:t>
+            </a:r>
+            <a:r>
+              <a:rPr lang="en" dirty="0" smtClean="0"/>
+              <a:t>into</a:t>
+            </a:r>
+            <a:r>
+              <a:rPr lang="en-US" dirty="0" smtClean="0"/>
+              <a:t> a</a:t>
+            </a:r>
+            <a:r>
+              <a:rPr lang="en" dirty="0" smtClean="0"/>
+              <a:t> </a:t>
+            </a:r>
+            <a:r>
+              <a:rPr lang="en" dirty="0"/>
+              <a:t>single push to master</a:t>
             </a:r>
           </a:p>
         </p:txBody>

</xml_diff>